<commit_message>
Update: 1강 PPT 완료
</commit_message>
<xml_diff>
--- a/과제PPT/기업업무 1강.pptx
+++ b/과제PPT/기업업무 1강.pptx
@@ -31,6 +31,7 @@
     <p:sldId id="281" r:id="rId25"/>
     <p:sldId id="284" r:id="rId26"/>
     <p:sldId id="263" r:id="rId27"/>
+    <p:sldId id="285" r:id="rId28"/>
   </p:sldIdLst>
   <p:sldSz cx="12192000" cy="6858000"/>
   <p:notesSz cx="6858000" cy="9144000"/>
@@ -349,7 +350,7 @@
             <a:fld id="{96DFF08F-DC6B-4601-B491-B0F83F6DD2DA}" type="datetimeFigureOut">
               <a:rPr lang="en-US" dirty="0"/>
               <a:pPr/>
-              <a:t>5/15/2023</a:t>
+              <a:t>5/16/2023</a:t>
             </a:fld>
             <a:endParaRPr lang="en-US" dirty="0"/>
           </a:p>
@@ -566,7 +567,7 @@
           <a:p>
             <a:fld id="{96DFF08F-DC6B-4601-B491-B0F83F6DD2DA}" type="datetimeFigureOut">
               <a:rPr lang="en-US" dirty="0"/>
-              <a:t>5/15/2023</a:t>
+              <a:t>5/16/2023</a:t>
             </a:fld>
             <a:endParaRPr lang="en-US" dirty="0"/>
           </a:p>
@@ -741,7 +742,7 @@
           <a:p>
             <a:fld id="{96DFF08F-DC6B-4601-B491-B0F83F6DD2DA}" type="datetimeFigureOut">
               <a:rPr lang="en-US" dirty="0"/>
-              <a:t>5/15/2023</a:t>
+              <a:t>5/16/2023</a:t>
             </a:fld>
             <a:endParaRPr lang="en-US" dirty="0"/>
           </a:p>
@@ -906,7 +907,7 @@
           <a:p>
             <a:fld id="{96DFF08F-DC6B-4601-B491-B0F83F6DD2DA}" type="datetimeFigureOut">
               <a:rPr lang="en-US" dirty="0"/>
-              <a:t>5/15/2023</a:t>
+              <a:t>5/16/2023</a:t>
             </a:fld>
             <a:endParaRPr lang="en-US" dirty="0"/>
           </a:p>
@@ -1175,7 +1176,7 @@
           <a:p>
             <a:fld id="{96DFF08F-DC6B-4601-B491-B0F83F6DD2DA}" type="datetimeFigureOut">
               <a:rPr lang="en-US" dirty="0"/>
-              <a:t>5/15/2023</a:t>
+              <a:t>5/16/2023</a:t>
             </a:fld>
             <a:endParaRPr lang="en-US" dirty="0"/>
           </a:p>
@@ -1493,7 +1494,7 @@
           <a:p>
             <a:fld id="{96DFF08F-DC6B-4601-B491-B0F83F6DD2DA}" type="datetimeFigureOut">
               <a:rPr lang="en-US" dirty="0"/>
-              <a:t>5/15/2023</a:t>
+              <a:t>5/16/2023</a:t>
             </a:fld>
             <a:endParaRPr lang="en-US" dirty="0"/>
           </a:p>
@@ -1912,7 +1913,7 @@
           <a:p>
             <a:fld id="{96DFF08F-DC6B-4601-B491-B0F83F6DD2DA}" type="datetimeFigureOut">
               <a:rPr lang="en-US" dirty="0"/>
-              <a:t>5/15/2023</a:t>
+              <a:t>5/16/2023</a:t>
             </a:fld>
             <a:endParaRPr lang="en-US" dirty="0"/>
           </a:p>
@@ -2025,7 +2026,7 @@
           <a:p>
             <a:fld id="{96DFF08F-DC6B-4601-B491-B0F83F6DD2DA}" type="datetimeFigureOut">
               <a:rPr lang="en-US" dirty="0"/>
-              <a:t>5/15/2023</a:t>
+              <a:t>5/16/2023</a:t>
             </a:fld>
             <a:endParaRPr lang="en-US" dirty="0"/>
           </a:p>
@@ -2115,7 +2116,7 @@
           <a:p>
             <a:fld id="{96DFF08F-DC6B-4601-B491-B0F83F6DD2DA}" type="datetimeFigureOut">
               <a:rPr lang="en-US" dirty="0"/>
-              <a:t>5/15/2023</a:t>
+              <a:t>5/16/2023</a:t>
             </a:fld>
             <a:endParaRPr lang="en-US" dirty="0"/>
           </a:p>
@@ -2400,7 +2401,7 @@
           <a:p>
             <a:fld id="{96DFF08F-DC6B-4601-B491-B0F83F6DD2DA}" type="datetimeFigureOut">
               <a:rPr lang="en-US" dirty="0"/>
-              <a:t>5/15/2023</a:t>
+              <a:t>5/16/2023</a:t>
             </a:fld>
             <a:endParaRPr lang="en-US" dirty="0"/>
           </a:p>
@@ -2667,7 +2668,7 @@
           <a:p>
             <a:fld id="{96DFF08F-DC6B-4601-B491-B0F83F6DD2DA}" type="datetimeFigureOut">
               <a:rPr lang="en-US" dirty="0"/>
-              <a:t>5/15/2023</a:t>
+              <a:t>5/16/2023</a:t>
             </a:fld>
             <a:endParaRPr lang="en-US" dirty="0"/>
           </a:p>
@@ -2917,7 +2918,7 @@
             <a:fld id="{96DFF08F-DC6B-4601-B491-B0F83F6DD2DA}" type="datetimeFigureOut">
               <a:rPr lang="en-US" dirty="0"/>
               <a:pPr/>
-              <a:t>5/15/2023</a:t>
+              <a:t>5/16/2023</a:t>
             </a:fld>
             <a:endParaRPr lang="en-US" dirty="0"/>
           </a:p>
@@ -7238,6 +7239,66 @@
           </a:prstGeom>
         </p:spPr>
       </p:pic>
+      <p:sp>
+        <p:nvSpPr>
+          <p:cNvPr id="3" name="TextBox 2">
+            <a:extLst>
+              <a:ext uri="{FF2B5EF4-FFF2-40B4-BE49-F238E27FC236}">
+                <a16:creationId xmlns:a16="http://schemas.microsoft.com/office/drawing/2014/main" xmlns="" id="{C27938AF-C4CD-C307-1903-32B5207903C5}"/>
+              </a:ext>
+            </a:extLst>
+          </p:cNvPr>
+          <p:cNvSpPr txBox="1"/>
+          <p:nvPr/>
+        </p:nvSpPr>
+        <p:spPr>
+          <a:xfrm>
+            <a:off x="509046" y="429144"/>
+            <a:ext cx="1442092" cy="523220"/>
+          </a:xfrm>
+          <a:prstGeom prst="rect">
+            <a:avLst/>
+          </a:prstGeom>
+          <a:noFill/>
+        </p:spPr>
+        <p:txBody>
+          <a:bodyPr wrap="square" rtlCol="0">
+            <a:spAutoFit/>
+          </a:bodyPr>
+          <a:lstStyle/>
+          <a:p>
+            <a:r>
+              <a:rPr lang="en-US" altLang="ko-KR" sz="2800" dirty="0">
+                <a:solidFill>
+                  <a:schemeClr val="accent1"/>
+                </a:solidFill>
+              </a:rPr>
+              <a:t>&lt; </a:t>
+            </a:r>
+            <a:r>
+              <a:rPr lang="ko-KR" altLang="en-US" sz="2800" dirty="0">
+                <a:solidFill>
+                  <a:schemeClr val="accent1"/>
+                </a:solidFill>
+              </a:rPr>
+              <a:t>결과 </a:t>
+            </a:r>
+            <a:r>
+              <a:rPr lang="en-US" altLang="ko-KR" sz="2800" dirty="0">
+                <a:solidFill>
+                  <a:schemeClr val="accent1"/>
+                </a:solidFill>
+              </a:rPr>
+              <a:t>&gt;</a:t>
+            </a:r>
+            <a:endParaRPr lang="ko-KR" altLang="en-US" sz="2800" dirty="0">
+              <a:solidFill>
+                <a:schemeClr val="accent1"/>
+              </a:solidFill>
+            </a:endParaRPr>
+          </a:p>
+        </p:txBody>
+      </p:sp>
     </p:spTree>
     <p:extLst>
       <p:ext uri="{BB962C8B-B14F-4D97-AF65-F5344CB8AC3E}">
@@ -7517,6 +7578,61 @@
           <a:chExt cx="0" cy="0"/>
         </a:xfrm>
       </p:grpSpPr>
+      <p:sp>
+        <p:nvSpPr>
+          <p:cNvPr id="2" name="TextBox 1"/>
+          <p:cNvSpPr txBox="1"/>
+          <p:nvPr/>
+        </p:nvSpPr>
+        <p:spPr>
+          <a:xfrm>
+            <a:off x="2084438" y="2664543"/>
+            <a:ext cx="8062452" cy="830997"/>
+          </a:xfrm>
+          <a:prstGeom prst="rect">
+            <a:avLst/>
+          </a:prstGeom>
+          <a:noFill/>
+        </p:spPr>
+        <p:txBody>
+          <a:bodyPr wrap="square" rtlCol="0">
+            <a:spAutoFit/>
+          </a:bodyPr>
+          <a:lstStyle/>
+          <a:p>
+            <a:pPr algn="ctr"/>
+            <a:r>
+              <a:rPr lang="en-US" altLang="ko-KR" sz="4800" b="1" dirty="0" smtClean="0">
+                <a:solidFill>
+                  <a:schemeClr val="accent1"/>
+                </a:solidFill>
+              </a:rPr>
+              <a:t>&lt; </a:t>
+            </a:r>
+            <a:r>
+              <a:rPr lang="ko-KR" altLang="en-US" sz="4800" b="1" dirty="0" smtClean="0">
+                <a:solidFill>
+                  <a:schemeClr val="accent1"/>
+                </a:solidFill>
+              </a:rPr>
+              <a:t>노트필기 정리하기 </a:t>
+            </a:r>
+            <a:r>
+              <a:rPr lang="en-US" altLang="ko-KR" sz="4800" b="1" dirty="0" smtClean="0">
+                <a:solidFill>
+                  <a:schemeClr val="accent1"/>
+                </a:solidFill>
+              </a:rPr>
+              <a:t>&gt;</a:t>
+            </a:r>
+            <a:endParaRPr lang="ko-KR" altLang="en-US" sz="4800" b="1" dirty="0">
+              <a:solidFill>
+                <a:schemeClr val="accent1"/>
+              </a:solidFill>
+            </a:endParaRPr>
+          </a:p>
+        </p:txBody>
+      </p:sp>
     </p:spTree>
     <p:extLst>
       <p:ext uri="{BB962C8B-B14F-4D97-AF65-F5344CB8AC3E}">
@@ -7547,10 +7663,136 @@
           <a:chExt cx="0" cy="0"/>
         </a:xfrm>
       </p:grpSpPr>
+      <p:pic>
+        <p:nvPicPr>
+          <p:cNvPr id="2" name="그림 1"/>
+          <p:cNvPicPr>
+            <a:picLocks noChangeAspect="1"/>
+          </p:cNvPicPr>
+          <p:nvPr/>
+        </p:nvPicPr>
+        <p:blipFill>
+          <a:blip r:embed="rId2"/>
+          <a:stretch>
+            <a:fillRect/>
+          </a:stretch>
+        </p:blipFill>
+        <p:spPr>
+          <a:xfrm>
+            <a:off x="329648" y="353961"/>
+            <a:ext cx="4153862" cy="6204831"/>
+          </a:xfrm>
+          <a:prstGeom prst="rect">
+            <a:avLst/>
+          </a:prstGeom>
+        </p:spPr>
+      </p:pic>
+      <p:pic>
+        <p:nvPicPr>
+          <p:cNvPr id="3" name="그림 2"/>
+          <p:cNvPicPr>
+            <a:picLocks noChangeAspect="1"/>
+          </p:cNvPicPr>
+          <p:nvPr/>
+        </p:nvPicPr>
+        <p:blipFill>
+          <a:blip r:embed="rId3"/>
+          <a:stretch>
+            <a:fillRect/>
+          </a:stretch>
+        </p:blipFill>
+        <p:spPr>
+          <a:xfrm>
+            <a:off x="4631270" y="353961"/>
+            <a:ext cx="4482989" cy="6204831"/>
+          </a:xfrm>
+          <a:prstGeom prst="rect">
+            <a:avLst/>
+          </a:prstGeom>
+        </p:spPr>
+      </p:pic>
     </p:spTree>
     <p:extLst>
       <p:ext uri="{BB962C8B-B14F-4D97-AF65-F5344CB8AC3E}">
         <p14:creationId xmlns:p14="http://schemas.microsoft.com/office/powerpoint/2010/main" val="196054215"/>
+      </p:ext>
+    </p:extLst>
+  </p:cSld>
+  <p:clrMapOvr>
+    <a:masterClrMapping/>
+  </p:clrMapOvr>
+</p:sld>
+</file>
+
+<file path=ppt/slides/slide27.xml><?xml version="1.0" encoding="utf-8"?>
+<p:sld xmlns:a="http://schemas.openxmlformats.org/drawingml/2006/main" xmlns:r="http://schemas.openxmlformats.org/officeDocument/2006/relationships" xmlns:p="http://schemas.openxmlformats.org/presentationml/2006/main">
+  <p:cSld>
+    <p:spTree>
+      <p:nvGrpSpPr>
+        <p:cNvPr id="1" name=""/>
+        <p:cNvGrpSpPr/>
+        <p:nvPr/>
+      </p:nvGrpSpPr>
+      <p:grpSpPr>
+        <a:xfrm>
+          <a:off x="0" y="0"/>
+          <a:ext cx="0" cy="0"/>
+          <a:chOff x="0" y="0"/>
+          <a:chExt cx="0" cy="0"/>
+        </a:xfrm>
+      </p:grpSpPr>
+      <p:pic>
+        <p:nvPicPr>
+          <p:cNvPr id="2" name="그림 1"/>
+          <p:cNvPicPr>
+            <a:picLocks noChangeAspect="1"/>
+          </p:cNvPicPr>
+          <p:nvPr/>
+        </p:nvPicPr>
+        <p:blipFill>
+          <a:blip r:embed="rId2"/>
+          <a:stretch>
+            <a:fillRect/>
+          </a:stretch>
+        </p:blipFill>
+        <p:spPr>
+          <a:xfrm>
+            <a:off x="346252" y="334297"/>
+            <a:ext cx="4245414" cy="6226607"/>
+          </a:xfrm>
+          <a:prstGeom prst="rect">
+            <a:avLst/>
+          </a:prstGeom>
+        </p:spPr>
+      </p:pic>
+      <p:pic>
+        <p:nvPicPr>
+          <p:cNvPr id="3" name="그림 2"/>
+          <p:cNvPicPr>
+            <a:picLocks noChangeAspect="1"/>
+          </p:cNvPicPr>
+          <p:nvPr/>
+        </p:nvPicPr>
+        <p:blipFill>
+          <a:blip r:embed="rId3"/>
+          <a:stretch>
+            <a:fillRect/>
+          </a:stretch>
+        </p:blipFill>
+        <p:spPr>
+          <a:xfrm>
+            <a:off x="4710341" y="334297"/>
+            <a:ext cx="4480120" cy="6226607"/>
+          </a:xfrm>
+          <a:prstGeom prst="rect">
+            <a:avLst/>
+          </a:prstGeom>
+        </p:spPr>
+      </p:pic>
+    </p:spTree>
+    <p:extLst>
+      <p:ext uri="{BB962C8B-B14F-4D97-AF65-F5344CB8AC3E}">
+        <p14:creationId xmlns:p14="http://schemas.microsoft.com/office/powerpoint/2010/main" val="3107886752"/>
       </p:ext>
     </p:extLst>
   </p:cSld>

</xml_diff>